<commit_message>
Présentation PPT: ajout de partie softcodage et description du softcodage (Pascal et Guillaume)
</commit_message>
<xml_diff>
--- a/NewtonERP/Documentation/BeeERP_presentation.pptx
+++ b/NewtonERP/Documentation/BeeERP_presentation.pptx
@@ -5,7 +5,7 @@
     <p:sldMasterId id="2147483660" r:id="rId1"/>
   </p:sldMasterIdLst>
   <p:notesMasterIdLst>
-    <p:notesMasterId r:id="rId15"/>
+    <p:notesMasterId r:id="rId16"/>
   </p:notesMasterIdLst>
   <p:sldIdLst>
     <p:sldId id="256" r:id="rId2"/>
@@ -20,7 +20,8 @@
     <p:sldId id="269" r:id="rId11"/>
     <p:sldId id="280" r:id="rId12"/>
     <p:sldId id="279" r:id="rId13"/>
-    <p:sldId id="271" r:id="rId14"/>
+    <p:sldId id="282" r:id="rId14"/>
+    <p:sldId id="271" r:id="rId15"/>
   </p:sldIdLst>
   <p:sldSz cx="9144000" cy="6858000" type="screen4x3"/>
   <p:notesSz cx="6858000" cy="9144000"/>
@@ -4207,13 +4208,7 @@
               <a:rPr lang="fr-CA" dirty="0" smtClean="0">
                 <a:hlinkClick r:id="rId2"/>
               </a:rPr>
-              <a:t>http://127.0.0.1:47098</a:t>
-            </a:r>
-            <a:r>
-              <a:rPr lang="fr-CA" dirty="0" smtClean="0">
-                <a:hlinkClick r:id="rId2"/>
-              </a:rPr>
-              <a:t>/</a:t>
+              <a:t>http://127.0.0.1:47098/</a:t>
             </a:r>
             <a:r>
               <a:rPr lang="fr-CA" dirty="0" smtClean="0"/>
@@ -4285,9 +4280,79 @@
         </p:nvSpPr>
         <p:spPr/>
         <p:txBody>
-          <a:bodyPr/>
-          <a:lstStyle/>
-          <a:p>
+          <a:bodyPr>
+            <a:normAutofit lnSpcReduction="10000"/>
+          </a:bodyPr>
+          <a:lstStyle/>
+          <a:p>
+            <a:r>
+              <a:rPr lang="fr-CA" dirty="0" smtClean="0"/>
+              <a:t>Entité </a:t>
+            </a:r>
+            <a:r>
+              <a:rPr lang="fr-CA" dirty="0" smtClean="0"/>
+              <a:t>d'affaire</a:t>
+            </a:r>
+          </a:p>
+          <a:p>
+            <a:pPr lvl="1"/>
+            <a:r>
+              <a:rPr lang="fr-CA" dirty="0" smtClean="0"/>
+              <a:t>Capsule </a:t>
+            </a:r>
+            <a:r>
+              <a:rPr lang="fr-CA" dirty="0" smtClean="0"/>
+              <a:t>d'information représentant un objet du monde </a:t>
+            </a:r>
+            <a:r>
+              <a:rPr lang="fr-CA" dirty="0" smtClean="0"/>
+              <a:t>réel</a:t>
+            </a:r>
+          </a:p>
+          <a:p>
+            <a:pPr lvl="1"/>
+            <a:r>
+              <a:rPr lang="fr-CA" dirty="0" smtClean="0"/>
+              <a:t>Exemple</a:t>
+            </a:r>
+          </a:p>
+          <a:p>
+            <a:pPr lvl="2"/>
+            <a:r>
+              <a:rPr lang="fr-CA" dirty="0" smtClean="0"/>
+              <a:t>Facture</a:t>
+            </a:r>
+          </a:p>
+          <a:p>
+            <a:pPr lvl="2"/>
+            <a:r>
+              <a:rPr lang="fr-CA" dirty="0" smtClean="0"/>
+              <a:t>Client</a:t>
+            </a:r>
+          </a:p>
+          <a:p>
+            <a:pPr lvl="2"/>
+            <a:r>
+              <a:rPr lang="fr-CA" dirty="0" smtClean="0"/>
+              <a:t>rendez-vous</a:t>
+            </a:r>
+          </a:p>
+          <a:p>
+            <a:r>
+              <a:rPr lang="fr-CA" dirty="0" smtClean="0"/>
+              <a:t>Tâches automatisées et accesseurs: </a:t>
+            </a:r>
+          </a:p>
+          <a:p>
+            <a:pPr lvl="1"/>
+            <a:r>
+              <a:rPr lang="fr-CA" dirty="0" smtClean="0"/>
+              <a:t>connections automatisées </a:t>
+            </a:r>
+            <a:r>
+              <a:rPr lang="fr-CA" dirty="0" smtClean="0"/>
+              <a:t>dans un genre de réseau (accesseurs)</a:t>
+            </a:r>
             <a:endParaRPr lang="fr-CA" dirty="0"/>
           </a:p>
         </p:txBody>
@@ -4420,54 +4485,86 @@
         </p:nvSpPr>
         <p:spPr/>
         <p:txBody>
-          <a:bodyPr/>
+          <a:bodyPr>
+            <a:normAutofit fontScale="92500"/>
+          </a:bodyPr>
           <a:lstStyle/>
           <a:p>
             <a:pPr lvl="1"/>
             <a:r>
               <a:rPr lang="fr-CA" dirty="0" smtClean="0"/>
-              <a:t>Création d'un champ dynamique sur une entité</a:t>
-            </a:r>
-            <a:endParaRPr lang="fr-CA" sz="3600" dirty="0" smtClean="0"/>
+              <a:t>Création </a:t>
+            </a:r>
+            <a:r>
+              <a:rPr lang="fr-CA" dirty="0" smtClean="0"/>
+              <a:t>/ démonstration de </a:t>
+            </a:r>
+            <a:r>
+              <a:rPr lang="fr-CA" dirty="0" smtClean="0"/>
+              <a:t>page </a:t>
+            </a:r>
+            <a:r>
+              <a:rPr lang="fr-CA" dirty="0" smtClean="0"/>
+              <a:t>horaire</a:t>
+            </a:r>
+          </a:p>
+          <a:p>
+            <a:pPr lvl="2"/>
+            <a:r>
+              <a:rPr lang="fr-CA" sz="3000" dirty="0" smtClean="0"/>
+              <a:t>nom: </a:t>
+            </a:r>
+            <a:r>
+              <a:rPr lang="fr-CA" sz="3000" dirty="0" smtClean="0"/>
+              <a:t>voyage</a:t>
+            </a:r>
           </a:p>
           <a:p>
             <a:pPr lvl="1"/>
             <a:r>
-              <a:rPr lang="fr-CA" dirty="0" smtClean="0"/>
-              <a:t>Création dynamique d'un module selon suggestion des auditeurs</a:t>
-            </a:r>
-            <a:endParaRPr lang="fr-CA" sz="3600" dirty="0" smtClean="0"/>
+              <a:rPr lang="fr-CA" sz="3200" dirty="0" smtClean="0"/>
+              <a:t>Création d’un champ dynamique</a:t>
+            </a:r>
           </a:p>
           <a:p>
             <a:pPr lvl="2"/>
             <a:r>
-              <a:rPr lang="fr-CA" dirty="0" smtClean="0"/>
-              <a:t>Module</a:t>
-            </a:r>
-            <a:endParaRPr lang="fr-CA" sz="3200" dirty="0" smtClean="0"/>
+              <a:rPr lang="fr-CA" sz="3000" dirty="0" smtClean="0"/>
+              <a:t>Sur facture: commentaire (champ texte)</a:t>
+            </a:r>
+          </a:p>
+          <a:p>
+            <a:pPr lvl="1"/>
+            <a:r>
+              <a:rPr lang="fr-CA" sz="3200" dirty="0" smtClean="0"/>
+              <a:t>Création de tâche automatisée</a:t>
+            </a:r>
           </a:p>
           <a:p>
             <a:pPr lvl="2"/>
             <a:r>
-              <a:rPr lang="fr-CA" dirty="0" smtClean="0"/>
-              <a:t>Entité</a:t>
-            </a:r>
-            <a:endParaRPr lang="fr-CA" sz="3200" dirty="0" smtClean="0"/>
+              <a:rPr lang="fr-CA" sz="3000" dirty="0" smtClean="0"/>
+              <a:t>(Elles servent </a:t>
+            </a:r>
+            <a:r>
+              <a:rPr lang="fr-CA" sz="3000" dirty="0" smtClean="0"/>
+              <a:t>à manipuler les entités </a:t>
+            </a:r>
+            <a:r>
+              <a:rPr lang="fr-CA" sz="3000" dirty="0" smtClean="0"/>
+              <a:t>d'affaire)</a:t>
+            </a:r>
           </a:p>
           <a:p>
             <a:pPr lvl="2"/>
             <a:r>
-              <a:rPr lang="fr-CA" dirty="0" smtClean="0"/>
-              <a:t>Accesseur</a:t>
-            </a:r>
-            <a:endParaRPr lang="fr-CA" sz="3200" dirty="0" smtClean="0"/>
-          </a:p>
-          <a:p>
-            <a:pPr lvl="2"/>
-            <a:r>
-              <a:rPr lang="fr-CA" dirty="0" err="1" smtClean="0"/>
-              <a:t>Task</a:t>
-            </a:r>
+              <a:rPr lang="fr-CA" sz="3000" dirty="0" smtClean="0"/>
+              <a:t>Création de transaction dans les finances lors de création de facture</a:t>
+            </a:r>
+            <a:endParaRPr lang="fr-CA" sz="3000" dirty="0" smtClean="0"/>
+          </a:p>
+          <a:p>
+            <a:pPr lvl="1"/>
             <a:endParaRPr lang="fr-CA" sz="3200" dirty="0" smtClean="0"/>
           </a:p>
           <a:p>
@@ -4553,6 +4650,150 @@
           <a:bodyPr/>
           <a:lstStyle/>
           <a:p>
+            <a:r>
+              <a:rPr lang="fr-CA" dirty="0" smtClean="0"/>
+              <a:t>Programmation graphique</a:t>
+            </a:r>
+            <a:endParaRPr lang="fr-CA" dirty="0"/>
+          </a:p>
+        </p:txBody>
+      </p:sp>
+      <p:sp>
+        <p:nvSpPr>
+          <p:cNvPr id="3" name="Espace réservé du contenu 2"/>
+          <p:cNvSpPr>
+            <a:spLocks noGrp="1"/>
+          </p:cNvSpPr>
+          <p:nvPr>
+            <p:ph idx="1"/>
+          </p:nvPr>
+        </p:nvSpPr>
+        <p:spPr/>
+        <p:txBody>
+          <a:bodyPr>
+            <a:normAutofit lnSpcReduction="10000"/>
+          </a:bodyPr>
+          <a:lstStyle/>
+          <a:p>
+            <a:r>
+              <a:rPr lang="fr-CA" dirty="0" smtClean="0"/>
+              <a:t>Création de </a:t>
+            </a:r>
+            <a:r>
+              <a:rPr lang="fr-CA" dirty="0" smtClean="0"/>
+              <a:t>module</a:t>
+            </a:r>
+          </a:p>
+          <a:p>
+            <a:pPr lvl="1"/>
+            <a:r>
+              <a:rPr lang="fr-CA" dirty="0" smtClean="0"/>
+              <a:t>Module: </a:t>
+            </a:r>
+            <a:r>
+              <a:rPr lang="fr-CA" dirty="0" smtClean="0"/>
+              <a:t>Livraison</a:t>
+            </a:r>
+          </a:p>
+          <a:p>
+            <a:pPr lvl="1"/>
+            <a:r>
+              <a:rPr lang="fr-CA" dirty="0" smtClean="0"/>
+              <a:t>Entités</a:t>
+            </a:r>
+          </a:p>
+          <a:p>
+            <a:pPr lvl="2"/>
+            <a:r>
+              <a:rPr lang="fr-CA" dirty="0" smtClean="0"/>
+              <a:t>Livreur</a:t>
+            </a:r>
+          </a:p>
+          <a:p>
+            <a:pPr lvl="2"/>
+            <a:r>
+              <a:rPr lang="fr-CA" dirty="0" smtClean="0"/>
+              <a:t>Camion</a:t>
+            </a:r>
+          </a:p>
+          <a:p>
+            <a:pPr lvl="2"/>
+            <a:r>
+              <a:rPr lang="fr-CA" dirty="0" smtClean="0"/>
+              <a:t>Pièce</a:t>
+            </a:r>
+          </a:p>
+          <a:p>
+            <a:pPr lvl="2"/>
+            <a:r>
+              <a:rPr lang="fr-CA" dirty="0" smtClean="0"/>
+              <a:t>Livraison</a:t>
+            </a:r>
+          </a:p>
+          <a:p>
+            <a:pPr lvl="1"/>
+            <a:r>
+              <a:rPr lang="fr-CA" dirty="0" smtClean="0"/>
+              <a:t>Accesseurs</a:t>
+            </a:r>
+          </a:p>
+          <a:p>
+            <a:pPr lvl="2"/>
+            <a:r>
+              <a:rPr lang="fr-CA" dirty="0" smtClean="0"/>
+              <a:t>Livreur -&gt; camion</a:t>
+            </a:r>
+          </a:p>
+          <a:p>
+            <a:pPr lvl="2"/>
+            <a:r>
+              <a:rPr lang="fr-CA" dirty="0" smtClean="0"/>
+              <a:t>Pièces -&gt; livraison</a:t>
+            </a:r>
+            <a:endParaRPr lang="fr-CA" dirty="0"/>
+          </a:p>
+        </p:txBody>
+      </p:sp>
+    </p:spTree>
+  </p:cSld>
+  <p:clrMapOvr>
+    <a:masterClrMapping/>
+  </p:clrMapOvr>
+</p:sld>
+</file>
+
+<file path=ppt/slides/slide14.xml><?xml version="1.0" encoding="utf-8"?>
+<p:sld xmlns:a="http://schemas.openxmlformats.org/drawingml/2006/main" xmlns:r="http://schemas.openxmlformats.org/officeDocument/2006/relationships" xmlns:p="http://schemas.openxmlformats.org/presentationml/2006/main">
+  <p:cSld>
+    <p:spTree>
+      <p:nvGrpSpPr>
+        <p:cNvPr id="1" name=""/>
+        <p:cNvGrpSpPr/>
+        <p:nvPr/>
+      </p:nvGrpSpPr>
+      <p:grpSpPr>
+        <a:xfrm>
+          <a:off x="0" y="0"/>
+          <a:ext cx="0" cy="0"/>
+          <a:chOff x="0" y="0"/>
+          <a:chExt cx="0" cy="0"/>
+        </a:xfrm>
+      </p:grpSpPr>
+      <p:sp>
+        <p:nvSpPr>
+          <p:cNvPr id="2" name="Titre 1"/>
+          <p:cNvSpPr>
+            <a:spLocks noGrp="1"/>
+          </p:cNvSpPr>
+          <p:nvPr>
+            <p:ph type="title"/>
+          </p:nvPr>
+        </p:nvSpPr>
+        <p:spPr/>
+        <p:txBody>
+          <a:bodyPr/>
+          <a:lstStyle/>
+          <a:p>
             <a:endParaRPr lang="fr-CA" dirty="0"/>
           </a:p>
         </p:txBody>
@@ -5019,11 +5260,7 @@
             </a:pPr>
             <a:r>
               <a:rPr lang="fr-CA" sz="2400" dirty="0" smtClean="0"/>
-              <a:t>É</a:t>
-            </a:r>
-            <a:r>
-              <a:rPr lang="fr-CA" sz="2400" dirty="0" smtClean="0"/>
-              <a:t>limine les causes d’erreur</a:t>
+              <a:t>Élimine les causes d’erreur</a:t>
             </a:r>
           </a:p>
           <a:p>
@@ -5185,11 +5422,7 @@
             <a:pPr lvl="0"/>
             <a:r>
               <a:rPr lang="fr-CA" sz="2800" dirty="0" smtClean="0"/>
-              <a:t>Flexibilité de base de </a:t>
-            </a:r>
-            <a:r>
-              <a:rPr lang="fr-CA" sz="2800" dirty="0" smtClean="0"/>
-              <a:t>donnée</a:t>
+              <a:t>Flexibilité de base de donnée</a:t>
             </a:r>
           </a:p>
           <a:p>
@@ -5200,25 +5433,8 @@
             <a:pPr lvl="0"/>
             <a:r>
               <a:rPr lang="fr-CA" sz="2800" dirty="0" smtClean="0"/>
-              <a:t>Système </a:t>
-            </a:r>
-            <a:r>
-              <a:rPr lang="fr-CA" sz="2800" dirty="0" smtClean="0"/>
-              <a:t>de base de </a:t>
-            </a:r>
-            <a:r>
-              <a:rPr lang="fr-CA" sz="2800" dirty="0" smtClean="0"/>
-              <a:t>donnée </a:t>
-            </a:r>
-            <a:r>
-              <a:rPr lang="fr-CA" sz="2800" dirty="0" smtClean="0"/>
-              <a:t>indépendant du </a:t>
-            </a:r>
-            <a:r>
-              <a:rPr lang="fr-CA" sz="2800" dirty="0" smtClean="0"/>
-              <a:t>logiciel et au choix du client</a:t>
-            </a:r>
-            <a:endParaRPr lang="fr-CA" sz="2800" dirty="0" smtClean="0"/>
+              <a:t>Système de base de donnée indépendant du logiciel et au choix du client</a:t>
+            </a:r>
           </a:p>
           <a:p>
             <a:pPr lvl="0"/>
@@ -5228,13 +5444,8 @@
             <a:pPr lvl="0"/>
             <a:r>
               <a:rPr lang="fr-CA" sz="2800" dirty="0" smtClean="0"/>
-              <a:t>Données </a:t>
-            </a:r>
-            <a:r>
-              <a:rPr lang="fr-CA" sz="2800" dirty="0" smtClean="0"/>
-              <a:t>inter-reliées ( Liste de valeurs ) </a:t>
-            </a:r>
-            <a:endParaRPr lang="fr-CA" sz="2800" dirty="0" smtClean="0"/>
+              <a:t>Données inter-reliées ( Liste de valeurs ) </a:t>
+            </a:r>
           </a:p>
           <a:p>
             <a:pPr lvl="0"/>
@@ -5254,7 +5465,6 @@
               <a:rPr lang="fr-CA" sz="2800" dirty="0" smtClean="0"/>
               <a:t>l’enregistrement de données (rapidité de développement)</a:t>
             </a:r>
-            <a:endParaRPr lang="fr-CA" sz="2800" dirty="0" smtClean="0"/>
           </a:p>
         </p:txBody>
       </p:sp>
@@ -5392,7 +5602,6 @@
               <a:rPr lang="fr-CA" dirty="0" smtClean="0"/>
               <a:t>Standardise les interfaces utilisateur</a:t>
             </a:r>
-            <a:endParaRPr lang="fr-CA" dirty="0" smtClean="0"/>
           </a:p>
           <a:p>
             <a:pPr lvl="0">
@@ -5491,15 +5700,7 @@
           <a:p>
             <a:r>
               <a:rPr lang="fr-CA" dirty="0" smtClean="0"/>
-              <a:t>Aspect </a:t>
-            </a:r>
-            <a:r>
-              <a:rPr lang="fr-CA" dirty="0" smtClean="0"/>
-              <a:t>Framework </a:t>
-            </a:r>
-            <a:r>
-              <a:rPr lang="fr-CA" dirty="0" smtClean="0"/>
-              <a:t>de développement de logiciel d'entreprise </a:t>
+              <a:t>Aspect Framework de développement de logiciel d'entreprise </a:t>
             </a:r>
             <a:endParaRPr lang="fr-CA" dirty="0"/>
           </a:p>
@@ -5675,7 +5876,6 @@
               <a:rPr lang="fr-CA" dirty="0" smtClean="0"/>
               <a:t>Permettent d’informatiser les règles d’affaires de l’entreprise. </a:t>
             </a:r>
-            <a:endParaRPr lang="fr-CA" dirty="0" smtClean="0"/>
           </a:p>
           <a:p>
             <a:pPr lvl="1">

</xml_diff>